<commit_message>
Update community talks 2023.8 slides
</commit_message>
<xml_diff>
--- a/ABP/Community-Talks-2023.8/Community-Talks-2023.8.pptx
+++ b/ABP/Community-Talks-2023.8/Community-Talks-2023.8.pptx
@@ -20,22 +20,21 @@
     <p:sldId id="265" r:id="rId14"/>
     <p:sldId id="266" r:id="rId15"/>
     <p:sldId id="267" r:id="rId16"/>
-    <p:sldId id="268" r:id="rId17"/>
   </p:sldIdLst>
   <p:sldSz cy="6858000" cx="12192000"/>
   <p:notesSz cx="6858000" cy="9144000"/>
   <p:embeddedFontLst>
     <p:embeddedFont>
       <p:font typeface="Poppins"/>
-      <p:regular r:id="rId18"/>
-      <p:bold r:id="rId19"/>
-      <p:italic r:id="rId20"/>
-      <p:boldItalic r:id="rId21"/>
+      <p:regular r:id="rId17"/>
+      <p:bold r:id="rId18"/>
+      <p:italic r:id="rId19"/>
+      <p:boldItalic r:id="rId20"/>
     </p:embeddedFont>
     <p:embeddedFont>
       <p:font typeface="Lexend"/>
-      <p:regular r:id="rId22"/>
-      <p:bold r:id="rId23"/>
+      <p:regular r:id="rId21"/>
+      <p:bold r:id="rId22"/>
     </p:embeddedFont>
   </p:embeddedFontLst>
   <p:defaultTextStyle>
@@ -1283,7 +1282,7 @@
                 <a:cs typeface="Poppins"/>
                 <a:sym typeface="Poppins"/>
               </a:rPr>
-              <a:t>ABP Suite allows you to create a master-detail relationship with a few clicks. It generates the necessary code for the master and detail tables, including the foreign key relationship between the two tables. It was one of the most wanted features and we are introducing it with ABP Commercial v8.0.</a:t>
+              <a:t>ABP Suite allows you to create a master-detail relationship with a few clicks. It generates the necessary code for the master and detail tables, including the foreign key relationship between the two tables. </a:t>
             </a:r>
             <a:endParaRPr sz="1500">
               <a:solidFill>
@@ -1395,123 +1394,6 @@
           <a:xfrm>
             <a:off x="381000" y="685800"/>
             <a:ext cx="6096000" cy="3429000"/>
-          </a:xfrm>
-          <a:custGeom>
-            <a:rect b="b" l="l" r="r" t="t"/>
-            <a:pathLst>
-              <a:path extrusionOk="0" h="120000" w="120000">
-                <a:moveTo>
-                  <a:pt x="0" y="0"/>
-                </a:moveTo>
-                <a:lnTo>
-                  <a:pt x="120000" y="0"/>
-                </a:lnTo>
-                <a:lnTo>
-                  <a:pt x="120000" y="120000"/>
-                </a:lnTo>
-                <a:lnTo>
-                  <a:pt x="0" y="120000"/>
-                </a:lnTo>
-                <a:close/>
-              </a:path>
-            </a:pathLst>
-          </a:custGeom>
-          <a:noFill/>
-          <a:ln cap="flat" cmpd="sng" w="9525">
-            <a:solidFill>
-              <a:srgbClr val="000000"/>
-            </a:solidFill>
-            <a:prstDash val="solid"/>
-            <a:round/>
-            <a:headEnd len="sm" w="sm" type="none"/>
-            <a:tailEnd len="sm" w="sm" type="none"/>
-          </a:ln>
-        </p:spPr>
-      </p:sp>
-    </p:spTree>
-  </p:cSld>
-  <p:clrMapOvr>
-    <a:masterClrMapping/>
-  </p:clrMapOvr>
-</p:notes>
-</file>
-
-<file path=ppt/notesSlides/notesSlide13.xml><?xml version="1.0" encoding="utf-8"?>
-<p:notes xmlns:a="http://schemas.openxmlformats.org/drawingml/2006/main" xmlns:r="http://schemas.openxmlformats.org/officeDocument/2006/relationships" xmlns:mc="http://schemas.openxmlformats.org/markup-compatibility/2006" xmlns:mv="urn:schemas-microsoft-com:mac:vml" xmlns:p="http://schemas.openxmlformats.org/presentationml/2006/main" xmlns:c="http://schemas.openxmlformats.org/drawingml/2006/chart" xmlns:dgm="http://schemas.openxmlformats.org/drawingml/2006/diagram" xmlns:o="urn:schemas-microsoft-com:office:office" xmlns:v="urn:schemas-microsoft-com:vml" xmlns:pvml="urn:schemas-microsoft-com:office:powerpoint" xmlns:com="http://schemas.openxmlformats.org/drawingml/2006/compatibility" xmlns:p14="http://schemas.microsoft.com/office/powerpoint/2010/main" xmlns:p15="http://schemas.microsoft.com/office/powerpoint/2012/main" xmlns:ahyp="http://schemas.microsoft.com/office/drawing/2018/hyperlinkcolor" showMasterPhAnim="0" showMasterSp="0">
-  <p:cSld>
-    <p:spTree>
-      <p:nvGrpSpPr>
-        <p:cNvPr id="170" name="Shape 170"/>
-        <p:cNvGrpSpPr/>
-        <p:nvPr/>
-      </p:nvGrpSpPr>
-      <p:grpSpPr>
-        <a:xfrm>
-          <a:off x="0" y="0"/>
-          <a:ext cx="0" cy="0"/>
-          <a:chOff x="0" y="0"/>
-          <a:chExt cx="0" cy="0"/>
-        </a:xfrm>
-      </p:grpSpPr>
-      <p:sp>
-        <p:nvSpPr>
-          <p:cNvPr id="171" name="Google Shape;171;p13:notes"/>
-          <p:cNvSpPr txBox="1"/>
-          <p:nvPr>
-            <p:ph idx="1" type="body"/>
-          </p:nvPr>
-        </p:nvSpPr>
-        <p:spPr>
-          <a:xfrm>
-            <a:off x="685800" y="4343400"/>
-            <a:ext cx="5486400" cy="4114800"/>
-          </a:xfrm>
-          <a:prstGeom prst="rect">
-            <a:avLst/>
-          </a:prstGeom>
-          <a:noFill/>
-          <a:ln>
-            <a:noFill/>
-          </a:ln>
-        </p:spPr>
-        <p:txBody>
-          <a:bodyPr anchorCtr="0" anchor="t" bIns="91425" lIns="91425" spcFirstLastPara="1" rIns="91425" wrap="square" tIns="91425">
-            <a:noAutofit/>
-          </a:bodyPr>
-          <a:lstStyle/>
-          <a:p>
-            <a:pPr indent="0" lvl="0" marL="0" rtl="0" algn="l">
-              <a:lnSpc>
-                <a:spcPct val="100000"/>
-              </a:lnSpc>
-              <a:spcBef>
-                <a:spcPts val="0"/>
-              </a:spcBef>
-              <a:spcAft>
-                <a:spcPts val="0"/>
-              </a:spcAft>
-              <a:buSzPts val="1100"/>
-              <a:buNone/>
-            </a:pPr>
-            <a:r>
-              <a:t/>
-            </a:r>
-            <a:endParaRPr/>
-          </a:p>
-        </p:txBody>
-      </p:sp>
-      <p:sp>
-        <p:nvSpPr>
-          <p:cNvPr id="172" name="Google Shape;172;p13:notes"/>
-          <p:cNvSpPr/>
-          <p:nvPr>
-            <p:ph idx="2" type="sldImg"/>
-          </p:nvPr>
-        </p:nvSpPr>
-        <p:spPr>
-          <a:xfrm>
-            <a:off x="1143225" y="685800"/>
-            <a:ext cx="4572225" cy="3429000"/>
           </a:xfrm>
           <a:custGeom>
             <a:rect b="b" l="l" r="r" t="t"/>
@@ -1624,7 +1506,7 @@
                 <a:cs typeface="Poppins"/>
                 <a:sym typeface="Poppins"/>
               </a:rPr>
-              <a:t>Today, I will some important features that came with ABP Framework 8.0. If you want to learn more, you can check the blog post.</a:t>
+              <a:t>Today, I will highlight some important features that came with ABP Framework 8.0. If you want to learn more, you can check the blog post.</a:t>
             </a:r>
             <a:endParaRPr>
               <a:solidFill>
@@ -2582,7 +2464,7 @@
                 <a:cs typeface="Poppins"/>
                 <a:sym typeface="Poppins"/>
               </a:rPr>
-              <a:t>EF Core read-only repository implementation uses EF Core’s No-Tracking Feature and that means the entities returned from the repository will not be tracked by the EF Core change tracker and this makes significant performance improvements.</a:t>
+              <a:t>It uses EF Core’s No-Tracking Feature behind the scenes, which means the entities returned from the repository will not be tracked by the EF Core’s change tracker and thanks to that you get significant performance gains.</a:t>
             </a:r>
             <a:endParaRPr/>
           </a:p>
@@ -2708,7 +2590,7 @@
                 <a:cs typeface="Poppins"/>
                 <a:sym typeface="Poppins"/>
               </a:rPr>
-              <a:t>Prior to this version, when you register with your social accounts in the first time, your email address was becoming your username and it was shown everywhere in the application. So, you would need to update your username later on. </a:t>
+              <a:t>Prior to this version, when you registered with your social accounts for the first time, your email address was becoming your username and it was shown everywhere in the application. So, you would need to update your username later on and this is not a good user experience.</a:t>
             </a:r>
             <a:endParaRPr sz="1800">
               <a:solidFill>
@@ -2771,7 +2653,70 @@
                 <a:cs typeface="Poppins"/>
                 <a:sym typeface="Poppins"/>
               </a:rPr>
-              <a:t>With this version now, whenever you register as an external user, a username and email address shown you in a form for you to revise and update them if you need, before login into the application. Thanks to that, after the social registration you would not need to update your username and email address. This is also good at the point of GDPR regulations because your email address will not be shown as username and will not be exposed.</a:t>
+              <a:t>Thus, in this version, we have enhanced this flow, and now, when you register as an external user for the first time, a username and email address are shown you in a form for you to revise and update if you want, before logging into the application. Thanks to that, after the social registration you would not need to update your username and email address. This is also good at the point of GDPR regulations because your email address will not be shown as a username and will not exposed. </a:t>
+            </a:r>
+            <a:endParaRPr sz="1800">
+              <a:solidFill>
+                <a:srgbClr val="5B636F"/>
+              </a:solidFill>
+              <a:latin typeface="Poppins"/>
+              <a:ea typeface="Poppins"/>
+              <a:cs typeface="Poppins"/>
+              <a:sym typeface="Poppins"/>
+            </a:endParaRPr>
+          </a:p>
+          <a:p>
+            <a:pPr indent="0" lvl="0" marL="0" rtl="0" algn="l">
+              <a:lnSpc>
+                <a:spcPct val="150000"/>
+              </a:lnSpc>
+              <a:spcBef>
+                <a:spcPts val="0"/>
+              </a:spcBef>
+              <a:spcAft>
+                <a:spcPts val="0"/>
+              </a:spcAft>
+              <a:buSzPts val="1100"/>
+              <a:buNone/>
+            </a:pPr>
+            <a:r>
+              <a:t/>
+            </a:r>
+            <a:endParaRPr sz="1800">
+              <a:solidFill>
+                <a:srgbClr val="5B636F"/>
+              </a:solidFill>
+              <a:latin typeface="Poppins"/>
+              <a:ea typeface="Poppins"/>
+              <a:cs typeface="Poppins"/>
+              <a:sym typeface="Poppins"/>
+            </a:endParaRPr>
+          </a:p>
+          <a:p>
+            <a:pPr indent="0" lvl="0" marL="0" rtl="0" algn="l">
+              <a:lnSpc>
+                <a:spcPct val="150000"/>
+              </a:lnSpc>
+              <a:spcBef>
+                <a:spcPts val="0"/>
+              </a:spcBef>
+              <a:spcAft>
+                <a:spcPts val="0"/>
+              </a:spcAft>
+              <a:buSzPts val="1100"/>
+              <a:buNone/>
+            </a:pPr>
+            <a:r>
+              <a:rPr lang="en-GB" sz="1800">
+                <a:solidFill>
+                  <a:srgbClr val="5B636F"/>
+                </a:solidFill>
+                <a:latin typeface="Poppins"/>
+                <a:ea typeface="Poppins"/>
+                <a:cs typeface="Poppins"/>
+                <a:sym typeface="Poppins"/>
+              </a:rPr>
+              <a:t>With this version now, when you register as an external user, a username and email address shown you in a form for you to revise and update them if you need, before login into the application. Thanks to that, after the social registration you would not need to update your username and email address. This is also good at the point of GDPR regulations because your email address will not be shown as username and will not be exposed.</a:t>
             </a:r>
             <a:endParaRPr sz="1800">
               <a:solidFill>
@@ -17098,7 +17043,31 @@
                 <a:cs typeface="Poppins"/>
                 <a:sym typeface="Poppins"/>
               </a:rPr>
-              <a:t>Suite: Generating </a:t>
+              <a:t>Suite: </a:t>
+            </a:r>
+            <a:r>
+              <a:rPr lang="en-GB" sz="2300">
+                <a:solidFill>
+                  <a:srgbClr val="5B636F"/>
+                </a:solidFill>
+                <a:latin typeface="Poppins"/>
+                <a:ea typeface="Poppins"/>
+                <a:cs typeface="Poppins"/>
+                <a:sym typeface="Poppins"/>
+              </a:rPr>
+              <a:t>Creating</a:t>
+            </a:r>
+            <a:r>
+              <a:rPr b="0" i="0" lang="en-GB" sz="2300" u="none" cap="none" strike="noStrike">
+                <a:solidFill>
+                  <a:srgbClr val="5B636F"/>
+                </a:solidFill>
+                <a:latin typeface="Poppins"/>
+                <a:ea typeface="Poppins"/>
+                <a:cs typeface="Poppins"/>
+                <a:sym typeface="Poppins"/>
+              </a:rPr>
+              <a:t> </a:t>
             </a:r>
             <a:r>
               <a:rPr b="1" i="0" lang="en-GB" sz="2300" u="none" cap="none" strike="noStrike">
@@ -17797,7 +17766,31 @@
                 <a:cs typeface="Lexend"/>
                 <a:sym typeface="Lexend"/>
               </a:rPr>
-              <a:t>Suite: Generating Master/Detail </a:t>
+              <a:t>Suite: </a:t>
+            </a:r>
+            <a:r>
+              <a:rPr b="1" lang="en-GB" sz="3200">
+                <a:solidFill>
+                  <a:srgbClr val="292D33"/>
+                </a:solidFill>
+                <a:latin typeface="Lexend"/>
+                <a:ea typeface="Lexend"/>
+                <a:cs typeface="Lexend"/>
+                <a:sym typeface="Lexend"/>
+              </a:rPr>
+              <a:t>Creating</a:t>
+            </a:r>
+            <a:r>
+              <a:rPr b="1" i="0" lang="en-GB" sz="3200" u="none" cap="none" strike="noStrike">
+                <a:solidFill>
+                  <a:srgbClr val="292D33"/>
+                </a:solidFill>
+                <a:latin typeface="Lexend"/>
+                <a:ea typeface="Lexend"/>
+                <a:cs typeface="Lexend"/>
+                <a:sym typeface="Lexend"/>
+              </a:rPr>
+              <a:t> Master/Detail </a:t>
             </a:r>
             <a:r>
               <a:rPr b="1" lang="en-GB" sz="3200">
@@ -17955,203 +17948,6 @@
               <a:ea typeface="Calibri"/>
               <a:cs typeface="Calibri"/>
               <a:sym typeface="Calibri"/>
-            </a:endParaRPr>
-          </a:p>
-        </p:txBody>
-      </p:sp>
-    </p:spTree>
-  </p:cSld>
-  <p:clrMapOvr>
-    <a:masterClrMapping/>
-  </p:clrMapOvr>
-</p:sld>
-</file>
-
-<file path=ppt/slides/slide13.xml><?xml version="1.0" encoding="utf-8"?>
-<p:sld xmlns:a="http://schemas.openxmlformats.org/drawingml/2006/main" xmlns:r="http://schemas.openxmlformats.org/officeDocument/2006/relationships" xmlns:mc="http://schemas.openxmlformats.org/markup-compatibility/2006" xmlns:mv="urn:schemas-microsoft-com:mac:vml" xmlns:p="http://schemas.openxmlformats.org/presentationml/2006/main" xmlns:c="http://schemas.openxmlformats.org/drawingml/2006/chart" xmlns:dgm="http://schemas.openxmlformats.org/drawingml/2006/diagram" xmlns:o="urn:schemas-microsoft-com:office:office" xmlns:v="urn:schemas-microsoft-com:vml" xmlns:pvml="urn:schemas-microsoft-com:office:powerpoint" xmlns:com="http://schemas.openxmlformats.org/drawingml/2006/compatibility" xmlns:p14="http://schemas.microsoft.com/office/powerpoint/2010/main" xmlns:p15="http://schemas.microsoft.com/office/powerpoint/2012/main" xmlns:ahyp="http://schemas.microsoft.com/office/drawing/2018/hyperlinkcolor">
-  <p:cSld>
-    <p:bg>
-      <p:bgPr>
-        <a:blipFill>
-          <a:blip r:embed="rId3">
-            <a:alphaModFix/>
-          </a:blip>
-          <a:stretch>
-            <a:fillRect/>
-          </a:stretch>
-        </a:blipFill>
-      </p:bgPr>
-    </p:bg>
-    <p:spTree>
-      <p:nvGrpSpPr>
-        <p:cNvPr id="173" name="Shape 173"/>
-        <p:cNvGrpSpPr/>
-        <p:nvPr/>
-      </p:nvGrpSpPr>
-      <p:grpSpPr>
-        <a:xfrm>
-          <a:off x="0" y="0"/>
-          <a:ext cx="0" cy="0"/>
-          <a:chOff x="0" y="0"/>
-          <a:chExt cx="0" cy="0"/>
-        </a:xfrm>
-      </p:grpSpPr>
-      <p:pic>
-        <p:nvPicPr>
-          <p:cNvPr id="174" name="Google Shape;174;p25"/>
-          <p:cNvPicPr preferRelativeResize="0"/>
-          <p:nvPr/>
-        </p:nvPicPr>
-        <p:blipFill rotWithShape="1">
-          <a:blip r:embed="rId4">
-            <a:alphaModFix/>
-          </a:blip>
-          <a:srcRect b="0" l="0" r="0" t="0"/>
-          <a:stretch/>
-        </p:blipFill>
-        <p:spPr>
-          <a:xfrm>
-            <a:off x="2581556" y="1733550"/>
-            <a:ext cx="2309127" cy="3352800"/>
-          </a:xfrm>
-          <a:prstGeom prst="rect">
-            <a:avLst/>
-          </a:prstGeom>
-          <a:noFill/>
-          <a:ln>
-            <a:noFill/>
-          </a:ln>
-        </p:spPr>
-      </p:pic>
-      <p:pic>
-        <p:nvPicPr>
-          <p:cNvPr id="175" name="Google Shape;175;p25"/>
-          <p:cNvPicPr preferRelativeResize="0"/>
-          <p:nvPr/>
-        </p:nvPicPr>
-        <p:blipFill rotWithShape="1">
-          <a:blip r:embed="rId5">
-            <a:alphaModFix/>
-          </a:blip>
-          <a:srcRect b="0" l="0" r="0" t="0"/>
-          <a:stretch/>
-        </p:blipFill>
-        <p:spPr>
-          <a:xfrm>
-            <a:off x="5128478" y="4022808"/>
-            <a:ext cx="1745886" cy="621019"/>
-          </a:xfrm>
-          <a:prstGeom prst="rect">
-            <a:avLst/>
-          </a:prstGeom>
-          <a:noFill/>
-          <a:ln>
-            <a:noFill/>
-          </a:ln>
-        </p:spPr>
-      </p:pic>
-      <p:sp>
-        <p:nvSpPr>
-          <p:cNvPr id="176" name="Google Shape;176;p25"/>
-          <p:cNvSpPr txBox="1"/>
-          <p:nvPr/>
-        </p:nvSpPr>
-        <p:spPr>
-          <a:xfrm>
-            <a:off x="4992441" y="2003724"/>
-            <a:ext cx="4993800" cy="1815900"/>
-          </a:xfrm>
-          <a:prstGeom prst="rect">
-            <a:avLst/>
-          </a:prstGeom>
-          <a:noFill/>
-          <a:ln>
-            <a:noFill/>
-          </a:ln>
-        </p:spPr>
-        <p:txBody>
-          <a:bodyPr anchorCtr="0" anchor="t" bIns="45700" lIns="91425" spcFirstLastPara="1" rIns="91425" wrap="square" tIns="45700">
-            <a:spAutoFit/>
-          </a:bodyPr>
-          <a:lstStyle/>
-          <a:p>
-            <a:pPr indent="0" lvl="0" marL="0" marR="0" rtl="0" algn="l">
-              <a:lnSpc>
-                <a:spcPct val="100000"/>
-              </a:lnSpc>
-              <a:spcBef>
-                <a:spcPts val="0"/>
-              </a:spcBef>
-              <a:spcAft>
-                <a:spcPts val="0"/>
-              </a:spcAft>
-              <a:buClr>
-                <a:srgbClr val="000000"/>
-              </a:buClr>
-              <a:buSzPts val="5600"/>
-              <a:buFont typeface="Arial"/>
-              <a:buNone/>
-            </a:pPr>
-            <a:r>
-              <a:rPr b="1" i="0" lang="en-GB" sz="5600" u="none" cap="none" strike="noStrike">
-                <a:solidFill>
-                  <a:srgbClr val="292D33"/>
-                </a:solidFill>
-                <a:latin typeface="Lexend"/>
-                <a:ea typeface="Lexend"/>
-                <a:cs typeface="Lexend"/>
-                <a:sym typeface="Lexend"/>
-              </a:rPr>
-              <a:t>THANKS FOR</a:t>
-            </a:r>
-            <a:endParaRPr b="0" i="0" sz="1400" u="none" cap="none" strike="noStrike">
-              <a:solidFill>
-                <a:srgbClr val="000000"/>
-              </a:solidFill>
-              <a:latin typeface="Arial"/>
-              <a:ea typeface="Arial"/>
-              <a:cs typeface="Arial"/>
-              <a:sym typeface="Arial"/>
-            </a:endParaRPr>
-          </a:p>
-          <a:p>
-            <a:pPr indent="0" lvl="0" marL="0" marR="0" rtl="0" algn="l">
-              <a:lnSpc>
-                <a:spcPct val="100000"/>
-              </a:lnSpc>
-              <a:spcBef>
-                <a:spcPts val="0"/>
-              </a:spcBef>
-              <a:spcAft>
-                <a:spcPts val="0"/>
-              </a:spcAft>
-              <a:buClr>
-                <a:srgbClr val="000000"/>
-              </a:buClr>
-              <a:buSzPts val="5600"/>
-              <a:buFont typeface="Arial"/>
-              <a:buNone/>
-            </a:pPr>
-            <a:r>
-              <a:rPr b="1" i="0" lang="en-GB" sz="5600" u="none" cap="none" strike="noStrike">
-                <a:solidFill>
-                  <a:srgbClr val="292D33"/>
-                </a:solidFill>
-                <a:latin typeface="Lexend"/>
-                <a:ea typeface="Lexend"/>
-                <a:cs typeface="Lexend"/>
-                <a:sym typeface="Lexend"/>
-              </a:rPr>
-              <a:t>WATCHING</a:t>
-            </a:r>
-            <a:endParaRPr b="1" i="0" sz="5600" u="none" cap="none" strike="noStrike">
-              <a:solidFill>
-                <a:srgbClr val="292D33"/>
-              </a:solidFill>
-              <a:latin typeface="Lexend"/>
-              <a:ea typeface="Lexend"/>
-              <a:cs typeface="Lexend"/>
-              <a:sym typeface="Lexend"/>
             </a:endParaRPr>
           </a:p>
         </p:txBody>
@@ -19672,7 +19468,7 @@
         <p:spPr>
           <a:xfrm>
             <a:off x="714375" y="1681675"/>
-            <a:ext cx="10491900" cy="4247400"/>
+            <a:ext cx="10491900" cy="4109700"/>
           </a:xfrm>
           <a:prstGeom prst="rect">
             <a:avLst/>
@@ -19751,7 +19547,31 @@
                 <a:cs typeface="Poppins"/>
                 <a:sym typeface="Poppins"/>
               </a:rPr>
-              <a:t>without need to re-login in each time.</a:t>
+              <a:t>without the need to re-login</a:t>
+            </a:r>
+            <a:r>
+              <a:rPr lang="en-GB" sz="1800">
+                <a:solidFill>
+                  <a:srgbClr val="5B636F"/>
+                </a:solidFill>
+                <a:latin typeface="Poppins"/>
+                <a:ea typeface="Poppins"/>
+                <a:cs typeface="Poppins"/>
+                <a:sym typeface="Poppins"/>
+              </a:rPr>
+              <a:t> </a:t>
+            </a:r>
+            <a:r>
+              <a:rPr b="0" i="0" lang="en-GB" sz="1800" u="none" cap="none" strike="noStrike">
+                <a:solidFill>
+                  <a:srgbClr val="5B636F"/>
+                </a:solidFill>
+                <a:latin typeface="Poppins"/>
+                <a:ea typeface="Poppins"/>
+                <a:cs typeface="Poppins"/>
+                <a:sym typeface="Poppins"/>
+              </a:rPr>
+              <a:t>each time.</a:t>
             </a:r>
             <a:endParaRPr/>
           </a:p>
@@ -19838,7 +19658,55 @@
                 <a:cs typeface="Poppins"/>
                 <a:sym typeface="Poppins"/>
               </a:rPr>
-              <a:t> feature is used to dynamically generate claims for the user in each request. This was needed because claims-based authentication is using in the ASP.NET Core, and because it stores the claims in the cookie or token, and they are being static, they don’t change until a next re-login. </a:t>
+              <a:t> feature is used to dynamically generate claims for the user in each request. This was needed because claims-based authentication is </a:t>
+            </a:r>
+            <a:r>
+              <a:rPr lang="en-GB" sz="1800">
+                <a:solidFill>
+                  <a:srgbClr val="5B636F"/>
+                </a:solidFill>
+                <a:latin typeface="Poppins"/>
+                <a:ea typeface="Poppins"/>
+                <a:cs typeface="Poppins"/>
+                <a:sym typeface="Poppins"/>
+              </a:rPr>
+              <a:t>used i</a:t>
+            </a:r>
+            <a:r>
+              <a:rPr b="0" i="0" lang="en-GB" sz="1800" u="none" cap="none" strike="noStrike">
+                <a:solidFill>
+                  <a:srgbClr val="5B636F"/>
+                </a:solidFill>
+                <a:latin typeface="Poppins"/>
+                <a:ea typeface="Poppins"/>
+                <a:cs typeface="Poppins"/>
+                <a:sym typeface="Poppins"/>
+              </a:rPr>
+              <a:t>n the ASP.NET Core, and because it stores the claims in the cookie or token, and they are static, they don’t change until </a:t>
+            </a:r>
+            <a:r>
+              <a:rPr lang="en-GB" sz="1800">
+                <a:solidFill>
+                  <a:srgbClr val="5B636F"/>
+                </a:solidFill>
+                <a:latin typeface="Poppins"/>
+                <a:ea typeface="Poppins"/>
+                <a:cs typeface="Poppins"/>
+                <a:sym typeface="Poppins"/>
+              </a:rPr>
+              <a:t>the</a:t>
+            </a:r>
+            <a:r>
+              <a:rPr b="0" i="0" lang="en-GB" sz="1800" u="none" cap="none" strike="noStrike">
+                <a:solidFill>
+                  <a:srgbClr val="5B636F"/>
+                </a:solidFill>
+                <a:latin typeface="Poppins"/>
+                <a:ea typeface="Poppins"/>
+                <a:cs typeface="Poppins"/>
+                <a:sym typeface="Poppins"/>
+              </a:rPr>
+              <a:t> next re-login. </a:t>
             </a:r>
             <a:endParaRPr b="0" i="0" sz="1800" u="none" cap="none" strike="noStrike">
               <a:solidFill>
@@ -20811,31 +20679,7 @@
                 <a:cs typeface="Poppins"/>
                 <a:sym typeface="Poppins"/>
               </a:rPr>
-              <a:t>In this version on, ABP Framework’s MVC / Razor Pages UI</a:t>
-            </a:r>
-            <a:r>
-              <a:rPr lang="en-GB" sz="1600">
-                <a:solidFill>
-                  <a:srgbClr val="5B636F"/>
-                </a:solidFill>
-                <a:latin typeface="Poppins"/>
-                <a:ea typeface="Poppins"/>
-                <a:cs typeface="Poppins"/>
-                <a:sym typeface="Poppins"/>
-              </a:rPr>
-              <a:t>’s</a:t>
-            </a:r>
-            <a:r>
-              <a:rPr b="0" i="0" lang="en-GB" sz="1600" u="none" cap="none" strike="noStrike">
-                <a:solidFill>
-                  <a:srgbClr val="5B636F"/>
-                </a:solidFill>
-                <a:latin typeface="Poppins"/>
-                <a:ea typeface="Poppins"/>
-                <a:cs typeface="Poppins"/>
-                <a:sym typeface="Poppins"/>
-              </a:rPr>
-              <a:t> </a:t>
+              <a:t>In this version, ABP Framework’s </a:t>
             </a:r>
             <a:r>
               <a:rPr b="0" i="0" lang="en-GB" sz="1600" u="sng" cap="none" strike="noStrike">
@@ -20872,7 +20716,43 @@
                 <a:cs typeface="Poppins"/>
                 <a:sym typeface="Poppins"/>
               </a:rPr>
-              <a:t>CDN Support</a:t>
+              <a:t>CDN Support </a:t>
+            </a:r>
+            <a:r>
+              <a:rPr lang="en-GB" sz="1600">
+                <a:solidFill>
+                  <a:srgbClr val="5B636F"/>
+                </a:solidFill>
+                <a:latin typeface="Poppins"/>
+                <a:ea typeface="Poppins"/>
+                <a:cs typeface="Poppins"/>
+                <a:sym typeface="Poppins"/>
+              </a:rPr>
+              <a:t>for MVC / </a:t>
+            </a:r>
+            <a:r>
+              <a:rPr lang="en-GB" sz="1600">
+                <a:solidFill>
+                  <a:srgbClr val="5B636F"/>
+                </a:solidFill>
+                <a:latin typeface="Poppins"/>
+                <a:ea typeface="Poppins"/>
+                <a:cs typeface="Poppins"/>
+                <a:sym typeface="Poppins"/>
+              </a:rPr>
+              <a:t>Razor</a:t>
+            </a:r>
+            <a:r>
+              <a:rPr lang="en-GB" sz="1600">
+                <a:solidFill>
+                  <a:srgbClr val="5B636F"/>
+                </a:solidFill>
+                <a:latin typeface="Poppins"/>
+                <a:ea typeface="Poppins"/>
+                <a:cs typeface="Poppins"/>
+                <a:sym typeface="Poppins"/>
+              </a:rPr>
+              <a:t> Pages</a:t>
             </a:r>
             <a:r>
               <a:rPr b="0" i="0" lang="en-GB" sz="1600" u="none" cap="none" strike="noStrike">
@@ -20979,7 +20859,31 @@
                 <a:cs typeface="Poppins"/>
                 <a:sym typeface="Poppins"/>
               </a:rPr>
-              <a:t> and places them as script tags into the page along with the bundled CSS/JS files.</a:t>
+              <a:t> and places them as script tags </a:t>
+            </a:r>
+            <a:r>
+              <a:rPr lang="en-GB" sz="1600">
+                <a:solidFill>
+                  <a:srgbClr val="5B636F"/>
+                </a:solidFill>
+                <a:latin typeface="Poppins"/>
+                <a:ea typeface="Poppins"/>
+                <a:cs typeface="Poppins"/>
+                <a:sym typeface="Poppins"/>
+              </a:rPr>
+              <a:t>on </a:t>
+            </a:r>
+            <a:r>
+              <a:rPr b="0" i="0" lang="en-GB" sz="1600" u="none" cap="none" strike="noStrike">
+                <a:solidFill>
+                  <a:srgbClr val="5B636F"/>
+                </a:solidFill>
+                <a:latin typeface="Poppins"/>
+                <a:ea typeface="Poppins"/>
+                <a:cs typeface="Poppins"/>
+                <a:sym typeface="Poppins"/>
+              </a:rPr>
+              <a:t>the page along with the bundled CSS/JS files.</a:t>
             </a:r>
             <a:endParaRPr b="0" i="0" sz="1600" u="none" cap="none" strike="noStrike">
               <a:solidFill>

</xml_diff>